<commit_message>
Changed paper name and updated the presentation.
</commit_message>
<xml_diff>
--- a/RDF-OLTP/docs/TechCast Days Presentation V2.pptx
+++ b/RDF-OLTP/docs/TechCast Days Presentation V2.pptx
@@ -7130,7 +7130,7 @@
         </p:spPr>
         <p:txBody>
           <a:bodyPr>
-            <a:normAutofit fontScale="85000" lnSpcReduction="20000"/>
+            <a:normAutofit fontScale="92500" lnSpcReduction="20000"/>
           </a:bodyPr>
           <a:lstStyle/>
           <a:p>
@@ -7174,12 +7174,12 @@
               <a:buNone/>
             </a:pPr>
             <a:r>
-              <a:rPr lang="en-US" sz="2600" dirty="0">
+              <a:rPr lang="en-US" sz="2200" dirty="0">
                 <a:hlinkClick r:id="rId3"/>
               </a:rPr>
               <a:t>https://github.com/CannataUT/RDF-OLTP</a:t>
             </a:r>
-            <a:endParaRPr lang="en-US" sz="2600" dirty="0"/>
+            <a:endParaRPr lang="en-US" sz="2200" dirty="0"/>
           </a:p>
           <a:p>
             <a:pPr marL="0" indent="0" algn="ctr">
@@ -7192,12 +7192,36 @@
               <a:buNone/>
             </a:pPr>
             <a:r>
-              <a:rPr lang="en-US" sz="2600" dirty="0">
+              <a:rPr lang="en-US" sz="2200" dirty="0">
                 <a:hlinkClick r:id="rId4"/>
               </a:rPr>
-              <a:t>https://github.com/AnalyticsandDataOracleUserCommunity/Analytics/RDF-OLTP</a:t>
-            </a:r>
-            <a:endParaRPr lang="en-US" sz="2600" dirty="0"/>
+              <a:t>https://</a:t>
+            </a:r>
+            <a:r>
+              <a:rPr lang="en-US" sz="2200" dirty="0" err="1">
+                <a:hlinkClick r:id="rId4"/>
+              </a:rPr>
+              <a:t>github.com</a:t>
+            </a:r>
+            <a:r>
+              <a:rPr lang="en-US" sz="2200" dirty="0">
+                <a:hlinkClick r:id="rId4"/>
+              </a:rPr>
+              <a:t>/</a:t>
+            </a:r>
+            <a:r>
+              <a:rPr lang="en-US" sz="2200" dirty="0" err="1">
+                <a:hlinkClick r:id="rId4"/>
+              </a:rPr>
+              <a:t>AnalyticsandDataOracleUserCommunity</a:t>
+            </a:r>
+            <a:r>
+              <a:rPr lang="en-US" sz="2200" dirty="0">
+                <a:hlinkClick r:id="rId4"/>
+              </a:rPr>
+              <a:t>/Analytics/tree/master/RDF-OLTP</a:t>
+            </a:r>
+            <a:endParaRPr lang="en-US" sz="2200" dirty="0"/>
           </a:p>
           <a:p>
             <a:pPr marL="0" indent="0" algn="ctr">
@@ -7215,19 +7239,9 @@
             <a:pPr marL="0" indent="0" algn="ctr">
               <a:buNone/>
             </a:pPr>
-            <a:endParaRPr lang="en-US" sz="2600" dirty="0"/>
-          </a:p>
-          <a:p>
-            <a:pPr marL="0" indent="0" algn="ctr">
-              <a:buNone/>
-            </a:pPr>
-            <a:r>
-              <a:rPr lang="en-US" sz="2600"/>
-              <a:t>Questions </a:t>
-            </a:r>
             <a:r>
               <a:rPr lang="en-US" sz="2600" dirty="0"/>
-              <a:t>can be addressed to: </a:t>
+              <a:t>Questions can be addressed to: </a:t>
             </a:r>
             <a:r>
               <a:rPr lang="en-US" sz="2600" dirty="0">
@@ -7261,13 +7275,13 @@
         </p:nvSpPr>
         <p:spPr>
           <a:xfrm>
-            <a:off x="9027041" y="3609754"/>
+            <a:off x="8743820" y="3712711"/>
             <a:ext cx="1318437" cy="717698"/>
           </a:xfrm>
           <a:prstGeom prst="wedgeRoundRectCallout">
             <a:avLst>
-              <a:gd name="adj1" fmla="val -87768"/>
-              <a:gd name="adj2" fmla="val 41759"/>
+              <a:gd name="adj1" fmla="val -82857"/>
+              <a:gd name="adj2" fmla="val 55290"/>
               <a:gd name="adj3" fmla="val 16667"/>
             </a:avLst>
           </a:prstGeom>
@@ -7324,8 +7338,8 @@
           </a:xfrm>
           <a:prstGeom prst="wedgeRoundRectCallout">
             <a:avLst>
-              <a:gd name="adj1" fmla="val -92607"/>
-              <a:gd name="adj2" fmla="val 106944"/>
+              <a:gd name="adj1" fmla="val -76649"/>
+              <a:gd name="adj2" fmla="val 137386"/>
               <a:gd name="adj3" fmla="val 16667"/>
             </a:avLst>
           </a:prstGeom>
@@ -7385,7 +7399,7 @@
         </p:blipFill>
         <p:spPr>
           <a:xfrm>
-            <a:off x="118731" y="3845443"/>
+            <a:off x="102547" y="2940537"/>
             <a:ext cx="1318436" cy="2056132"/>
           </a:xfrm>
           <a:prstGeom prst="rect">

</xml_diff>